<commit_message>
Update How to talk to SUMO through python API.pptx
</commit_message>
<xml_diff>
--- a/Documents/How to talk to SUMO through python API.pptx
+++ b/Documents/How to talk to SUMO through python API.pptx
@@ -122,7 +122,7 @@
 <file path=ppt/revisionInfo.xml><?xml version="1.0" encoding="utf-8"?>
 <p1510:revInfo xmlns:a="http://schemas.openxmlformats.org/drawingml/2006/main" xmlns:r="http://schemas.openxmlformats.org/officeDocument/2006/relationships" xmlns:p1510="http://schemas.microsoft.com/office/powerpoint/2015/10/main">
   <p1510:revLst>
-    <p1510:client id="{7F64D240-3E79-4187-AF05-D5003B7B6E5F}" v="1" dt="2022-06-17T17:26:37.076"/>
+    <p1510:client id="{7F64D240-3E79-4187-AF05-D5003B7B6E5F}" v="2" dt="2022-06-17T17:28:40.278"/>
     <p1510:client id="{F1C4FAFD-8A63-469D-B3E7-3EFAA20C9B0D}" v="503" dt="2022-06-16T19:39:08.225"/>
     <p1510:client id="{F7B29F24-D405-4075-A775-AAD9F01D4005}" v="69" dt="2022-06-16T19:47:11.120"/>
   </p1510:revLst>
@@ -134,18 +134,18 @@
   <pc:docChgLst>
     <pc:chgData name="Bai, Wushuang" userId="08313185-81e5-4dc5-a3b5-3eb13206e8d2" providerId="ADAL" clId="{7F64D240-3E79-4187-AF05-D5003B7B6E5F}"/>
     <pc:docChg chg="modSld">
-      <pc:chgData name="Bai, Wushuang" userId="08313185-81e5-4dc5-a3b5-3eb13206e8d2" providerId="ADAL" clId="{7F64D240-3E79-4187-AF05-D5003B7B6E5F}" dt="2022-06-17T17:26:37.076" v="3"/>
+      <pc:chgData name="Bai, Wushuang" userId="08313185-81e5-4dc5-a3b5-3eb13206e8d2" providerId="ADAL" clId="{7F64D240-3E79-4187-AF05-D5003B7B6E5F}" dt="2022-06-17T17:28:47.688" v="7" actId="403"/>
       <pc:docMkLst>
         <pc:docMk/>
       </pc:docMkLst>
       <pc:sldChg chg="modSp mod">
-        <pc:chgData name="Bai, Wushuang" userId="08313185-81e5-4dc5-a3b5-3eb13206e8d2" providerId="ADAL" clId="{7F64D240-3E79-4187-AF05-D5003B7B6E5F}" dt="2022-06-17T17:26:37.076" v="3"/>
+        <pc:chgData name="Bai, Wushuang" userId="08313185-81e5-4dc5-a3b5-3eb13206e8d2" providerId="ADAL" clId="{7F64D240-3E79-4187-AF05-D5003B7B6E5F}" dt="2022-06-17T17:28:47.688" v="7" actId="403"/>
         <pc:sldMkLst>
           <pc:docMk/>
           <pc:sldMk cId="1775876560" sldId="259"/>
         </pc:sldMkLst>
         <pc:spChg chg="mod">
-          <ac:chgData name="Bai, Wushuang" userId="08313185-81e5-4dc5-a3b5-3eb13206e8d2" providerId="ADAL" clId="{7F64D240-3E79-4187-AF05-D5003B7B6E5F}" dt="2022-06-17T17:26:37.076" v="3"/>
+          <ac:chgData name="Bai, Wushuang" userId="08313185-81e5-4dc5-a3b5-3eb13206e8d2" providerId="ADAL" clId="{7F64D240-3E79-4187-AF05-D5003B7B6E5F}" dt="2022-06-17T17:28:47.688" v="7" actId="403"/>
           <ac:spMkLst>
             <pc:docMk/>
             <pc:sldMk cId="1775876560" sldId="259"/>
@@ -3541,7 +3541,7 @@
         <p:spPr>
           <a:xfrm>
             <a:off x="747295" y="2057400"/>
-            <a:ext cx="9600547" cy="2031325"/>
+            <a:ext cx="9600547" cy="1723549"/>
           </a:xfrm>
           <a:prstGeom prst="rect">
             <a:avLst/>
@@ -3568,11 +3568,11 @@
               <a:t>Simulation files can be found here: </a:t>
             </a:r>
             <a:r>
-              <a:rPr lang="en-US" sz="1200" dirty="0">
+              <a:rPr lang="en-US" sz="1600" dirty="0">
                 <a:ea typeface="+mn-lt"/>
                 <a:cs typeface="+mn-lt"/>
               </a:rPr>
-              <a:t>https://pennstateoffice365.sharepoint.com/:f:/r/sites/IntelligentVehiclesandSystemsGroup-Active/Shared%20Documents/IVSG/Projects/Active/2021-2024_PennDOT_ADS_ConstructionZones/12_SUMO_Simulation_Pretesting/Testing_Data/how%20to%20export%20SUMO%20simulation%20results?csf=1&amp;web=1&amp;e=x1Pk83</a:t>
+              <a:t>https://github.com/ivsg-psu/TrafficSimulators_GettingStartedWithDifferrentSimulators_GettingStartedWithSUMO/tree/main/Data</a:t>
             </a:r>
             <a:endParaRPr lang="en-US" sz="1200" dirty="0">
               <a:cs typeface="Calibri"/>
@@ -3587,13 +3587,7 @@
               <a:rPr lang="en-US" dirty="0">
                 <a:cs typeface="Calibri"/>
               </a:rPr>
-              <a:t>Script can be found here</a:t>
-            </a:r>
-            <a:r>
-              <a:rPr lang="en-US">
-                <a:cs typeface="Calibri"/>
-              </a:rPr>
-              <a:t>: https://github.com/ivsg-psu/TrafficSimulators_GettingStartedWithDifferrentSimulators_GettingStartedWithSUMO/tree/main/Code</a:t>
+              <a:t>Script can be found here: https://github.com/ivsg-psu/TrafficSimulators_GettingStartedWithDifferrentSimulators_GettingStartedWithSUMO/tree/main/Code</a:t>
             </a:r>
           </a:p>
           <a:p>
@@ -4672,15 +4666,6 @@
 </file>
 
 <file path=customXml/item2.xml><?xml version="1.0" encoding="utf-8"?>
-<?mso-contentType ?>
-<FormTemplates xmlns="http://schemas.microsoft.com/sharepoint/v3/contenttype/forms">
-  <Display>DocumentLibraryForm</Display>
-  <Edit>DocumentLibraryForm</Edit>
-  <New>DocumentLibraryForm</New>
-</FormTemplates>
-</file>
-
-<file path=customXml/item3.xml><?xml version="1.0" encoding="utf-8"?>
 <p:properties xmlns:p="http://schemas.microsoft.com/office/2006/metadata/properties" xmlns:xsi="http://www.w3.org/2001/XMLSchema-instance" xmlns:pc="http://schemas.microsoft.com/office/infopath/2007/PartnerControls">
   <documentManagement>
     <Size xmlns="c7c738f6-68ec-422e-b0e4-3523873f7adf" xsi:nil="true"/>
@@ -4691,6 +4676,15 @@
     <_Flow_SignoffStatus xmlns="c7c738f6-68ec-422e-b0e4-3523873f7adf" xsi:nil="true"/>
   </documentManagement>
 </p:properties>
+</file>
+
+<file path=customXml/item3.xml><?xml version="1.0" encoding="utf-8"?>
+<?mso-contentType ?>
+<FormTemplates xmlns="http://schemas.microsoft.com/sharepoint/v3/contenttype/forms">
+  <Display>DocumentLibraryForm</Display>
+  <Edit>DocumentLibraryForm</Edit>
+  <New>DocumentLibraryForm</New>
+</FormTemplates>
 </file>
 
 <file path=customXml/itemProps1.xml><?xml version="1.0" encoding="utf-8"?>
@@ -4713,14 +4707,6 @@
 </file>
 
 <file path=customXml/itemProps2.xml><?xml version="1.0" encoding="utf-8"?>
-<ds:datastoreItem xmlns:ds="http://schemas.openxmlformats.org/officeDocument/2006/customXml" ds:itemID="{B4289391-3766-46F2-BA66-C692E9086156}">
-  <ds:schemaRefs>
-    <ds:schemaRef ds:uri="http://schemas.microsoft.com/sharepoint/v3/contenttype/forms"/>
-  </ds:schemaRefs>
-</ds:datastoreItem>
-</file>
-
-<file path=customXml/itemProps3.xml><?xml version="1.0" encoding="utf-8"?>
 <ds:datastoreItem xmlns:ds="http://schemas.openxmlformats.org/officeDocument/2006/customXml" ds:itemID="{4977DC43-A29B-46F8-92E7-ECBC78C89266}">
   <ds:schemaRefs>
     <ds:schemaRef ds:uri="http://schemas.microsoft.com/office/2006/metadata/properties"/>
@@ -4729,4 +4715,12 @@
     <ds:schemaRef ds:uri="542b8847-f5d4-4c9f-bd30-657d16e5db1d"/>
   </ds:schemaRefs>
 </ds:datastoreItem>
+</file>
+
+<file path=customXml/itemProps3.xml><?xml version="1.0" encoding="utf-8"?>
+<ds:datastoreItem xmlns:ds="http://schemas.openxmlformats.org/officeDocument/2006/customXml" ds:itemID="{B4289391-3766-46F2-BA66-C692E9086156}">
+  <ds:schemaRefs>
+    <ds:schemaRef ds:uri="http://schemas.microsoft.com/sharepoint/v3/contenttype/forms"/>
+  </ds:schemaRefs>
+</ds:datastoreItem>
 </file>
</xml_diff>